<commit_message>
add pop-up transition using jQuery, take user inputs for customization, enable keyboard shortcuts for play, pause, and settings window
</commit_message>
<xml_diff>
--- a/design/design.pptx
+++ b/design/design.pptx
@@ -6,7 +6,8 @@
   </p:sldMasterIdLst>
   <p:sldIdLst>
     <p:sldId id="256" r:id="rId2"/>
-    <p:sldId id="257" r:id="rId3"/>
+    <p:sldId id="258" r:id="rId3"/>
+    <p:sldId id="257" r:id="rId4"/>
   </p:sldIdLst>
   <p:sldSz cx="12192000" cy="6858000"/>
   <p:notesSz cx="6858000" cy="9144000"/>
@@ -271,7 +272,7 @@
           <a:p>
             <a:fld id="{C0C0AE04-5E48-4D93-B2FD-C1E8F37F7FCD}" type="datetimeFigureOut">
               <a:rPr lang="ko-KR" altLang="en-US" smtClean="0"/>
-              <a:t>2018-10-17</a:t>
+              <a:t>2018-10-22</a:t>
             </a:fld>
             <a:endParaRPr lang="ko-KR" altLang="en-US"/>
           </a:p>
@@ -469,7 +470,7 @@
           <a:p>
             <a:fld id="{C0C0AE04-5E48-4D93-B2FD-C1E8F37F7FCD}" type="datetimeFigureOut">
               <a:rPr lang="ko-KR" altLang="en-US" smtClean="0"/>
-              <a:t>2018-10-17</a:t>
+              <a:t>2018-10-22</a:t>
             </a:fld>
             <a:endParaRPr lang="ko-KR" altLang="en-US"/>
           </a:p>
@@ -677,7 +678,7 @@
           <a:p>
             <a:fld id="{C0C0AE04-5E48-4D93-B2FD-C1E8F37F7FCD}" type="datetimeFigureOut">
               <a:rPr lang="ko-KR" altLang="en-US" smtClean="0"/>
-              <a:t>2018-10-17</a:t>
+              <a:t>2018-10-22</a:t>
             </a:fld>
             <a:endParaRPr lang="ko-KR" altLang="en-US"/>
           </a:p>
@@ -875,7 +876,7 @@
           <a:p>
             <a:fld id="{C0C0AE04-5E48-4D93-B2FD-C1E8F37F7FCD}" type="datetimeFigureOut">
               <a:rPr lang="ko-KR" altLang="en-US" smtClean="0"/>
-              <a:t>2018-10-17</a:t>
+              <a:t>2018-10-22</a:t>
             </a:fld>
             <a:endParaRPr lang="ko-KR" altLang="en-US"/>
           </a:p>
@@ -1150,7 +1151,7 @@
           <a:p>
             <a:fld id="{C0C0AE04-5E48-4D93-B2FD-C1E8F37F7FCD}" type="datetimeFigureOut">
               <a:rPr lang="ko-KR" altLang="en-US" smtClean="0"/>
-              <a:t>2018-10-17</a:t>
+              <a:t>2018-10-22</a:t>
             </a:fld>
             <a:endParaRPr lang="ko-KR" altLang="en-US"/>
           </a:p>
@@ -1415,7 +1416,7 @@
           <a:p>
             <a:fld id="{C0C0AE04-5E48-4D93-B2FD-C1E8F37F7FCD}" type="datetimeFigureOut">
               <a:rPr lang="ko-KR" altLang="en-US" smtClean="0"/>
-              <a:t>2018-10-17</a:t>
+              <a:t>2018-10-22</a:t>
             </a:fld>
             <a:endParaRPr lang="ko-KR" altLang="en-US"/>
           </a:p>
@@ -1827,7 +1828,7 @@
           <a:p>
             <a:fld id="{C0C0AE04-5E48-4D93-B2FD-C1E8F37F7FCD}" type="datetimeFigureOut">
               <a:rPr lang="ko-KR" altLang="en-US" smtClean="0"/>
-              <a:t>2018-10-17</a:t>
+              <a:t>2018-10-22</a:t>
             </a:fld>
             <a:endParaRPr lang="ko-KR" altLang="en-US"/>
           </a:p>
@@ -1968,7 +1969,7 @@
           <a:p>
             <a:fld id="{C0C0AE04-5E48-4D93-B2FD-C1E8F37F7FCD}" type="datetimeFigureOut">
               <a:rPr lang="ko-KR" altLang="en-US" smtClean="0"/>
-              <a:t>2018-10-17</a:t>
+              <a:t>2018-10-22</a:t>
             </a:fld>
             <a:endParaRPr lang="ko-KR" altLang="en-US"/>
           </a:p>
@@ -2081,7 +2082,7 @@
           <a:p>
             <a:fld id="{C0C0AE04-5E48-4D93-B2FD-C1E8F37F7FCD}" type="datetimeFigureOut">
               <a:rPr lang="ko-KR" altLang="en-US" smtClean="0"/>
-              <a:t>2018-10-17</a:t>
+              <a:t>2018-10-22</a:t>
             </a:fld>
             <a:endParaRPr lang="ko-KR" altLang="en-US"/>
           </a:p>
@@ -2392,7 +2393,7 @@
           <a:p>
             <a:fld id="{C0C0AE04-5E48-4D93-B2FD-C1E8F37F7FCD}" type="datetimeFigureOut">
               <a:rPr lang="ko-KR" altLang="en-US" smtClean="0"/>
-              <a:t>2018-10-17</a:t>
+              <a:t>2018-10-22</a:t>
             </a:fld>
             <a:endParaRPr lang="ko-KR" altLang="en-US"/>
           </a:p>
@@ -2680,7 +2681,7 @@
           <a:p>
             <a:fld id="{C0C0AE04-5E48-4D93-B2FD-C1E8F37F7FCD}" type="datetimeFigureOut">
               <a:rPr lang="ko-KR" altLang="en-US" smtClean="0"/>
-              <a:t>2018-10-17</a:t>
+              <a:t>2018-10-22</a:t>
             </a:fld>
             <a:endParaRPr lang="ko-KR" altLang="en-US"/>
           </a:p>
@@ -2921,7 +2922,7 @@
           <a:p>
             <a:fld id="{C0C0AE04-5E48-4D93-B2FD-C1E8F37F7FCD}" type="datetimeFigureOut">
               <a:rPr lang="ko-KR" altLang="en-US" smtClean="0"/>
-              <a:t>2018-10-17</a:t>
+              <a:t>2018-10-22</a:t>
             </a:fld>
             <a:endParaRPr lang="ko-KR" altLang="en-US"/>
           </a:p>
@@ -3888,8 +3889,8 @@
         </p:nvSpPr>
         <p:spPr>
           <a:xfrm>
-            <a:off x="6095999" y="4517589"/>
-            <a:ext cx="5905734" cy="1384995"/>
+            <a:off x="6142306" y="4194081"/>
+            <a:ext cx="5905734" cy="1938992"/>
           </a:xfrm>
           <a:prstGeom prst="rect">
             <a:avLst/>
@@ -3924,8 +3925,13 @@
             </a:pPr>
             <a:r>
               <a:rPr lang="en-US" altLang="ko-KR" sz="1200" dirty="0"/>
-              <a:t>Add transitions to the pop-up;</a:t>
-            </a:r>
+              <a:t>Add transitions to the pop-up; </a:t>
+            </a:r>
+            <a:r>
+              <a:rPr lang="ko-KR" altLang="en-US" sz="1200" dirty="0" err="1"/>
+              <a:t>ㅇ</a:t>
+            </a:r>
+            <a:endParaRPr lang="en-US" altLang="ko-KR" sz="1200" dirty="0"/>
           </a:p>
           <a:p>
             <a:pPr marL="171450" indent="-171450">
@@ -3934,7 +3940,7 @@
             </a:pPr>
             <a:r>
               <a:rPr lang="en-US" altLang="ko-KR" sz="1200" dirty="0"/>
-              <a:t>Get user input for session, rest, long rest times.</a:t>
+              <a:t>Get user input for session, rest, long rest times.(take only positive integer input) </a:t>
             </a:r>
           </a:p>
           <a:p>
@@ -3944,7 +3950,7 @@
             </a:pPr>
             <a:r>
               <a:rPr lang="en-US" altLang="ko-KR" sz="1200" dirty="0"/>
-              <a:t>When clicked on the menu, be able to go back to any part of the timer</a:t>
+              <a:t>Include repeat forever checkbox for session number</a:t>
             </a:r>
           </a:p>
           <a:p>
@@ -3954,7 +3960,7 @@
             </a:pPr>
             <a:r>
               <a:rPr lang="en-US" altLang="ko-KR" sz="1200" dirty="0"/>
-              <a:t>Add sound bell</a:t>
+              <a:t>When clicked on the menu, be able to go back to any part of the timer</a:t>
             </a:r>
           </a:p>
           <a:p>
@@ -3964,7 +3970,27 @@
             </a:pPr>
             <a:r>
               <a:rPr lang="en-US" altLang="ko-KR" sz="1200" dirty="0"/>
+              <a:t>Add sound bell</a:t>
+            </a:r>
+          </a:p>
+          <a:p>
+            <a:pPr marL="171450" indent="-171450">
+              <a:buFontTx/>
+              <a:buChar char="-"/>
+            </a:pPr>
+            <a:r>
+              <a:rPr lang="en-US" altLang="ko-KR" sz="1200" dirty="0"/>
               <a:t>Customize sound bell and when it will ring before time is out.</a:t>
+            </a:r>
+          </a:p>
+          <a:p>
+            <a:pPr marL="171450" indent="-171450">
+              <a:buFontTx/>
+              <a:buChar char="-"/>
+            </a:pPr>
+            <a:r>
+              <a:rPr lang="en-US" altLang="ko-KR" sz="1200" dirty="0"/>
+              <a:t>Make a linear progression bar at the bottom showing which section the user is currently at.  Toggle hide and show. </a:t>
             </a:r>
             <a:endParaRPr lang="ko-KR" altLang="en-US" sz="1200" dirty="0"/>
           </a:p>
@@ -4261,6 +4287,612 @@
                 <a:schemeClr val="bg1"/>
               </a:solidFill>
             </a:endParaRPr>
+          </a:p>
+        </p:txBody>
+      </p:sp>
+      <p:sp>
+        <p:nvSpPr>
+          <p:cNvPr id="6" name="사각형: 둥근 모서리 5">
+            <a:extLst>
+              <a:ext uri="{FF2B5EF4-FFF2-40B4-BE49-F238E27FC236}">
+                <a16:creationId xmlns:a16="http://schemas.microsoft.com/office/drawing/2014/main" id="{BBFB2319-14FA-4987-981C-302AB1DF1B8E}"/>
+              </a:ext>
+            </a:extLst>
+          </p:cNvPr>
+          <p:cNvSpPr/>
+          <p:nvPr/>
+        </p:nvSpPr>
+        <p:spPr>
+          <a:xfrm>
+            <a:off x="6267635" y="6294268"/>
+            <a:ext cx="5655076" cy="221942"/>
+          </a:xfrm>
+          <a:prstGeom prst="roundRect">
+            <a:avLst>
+              <a:gd name="adj" fmla="val 50000"/>
+            </a:avLst>
+          </a:prstGeom>
+          <a:noFill/>
+          <a:ln>
+            <a:solidFill>
+              <a:schemeClr val="tx1"/>
+            </a:solidFill>
+          </a:ln>
+        </p:spPr>
+        <p:style>
+          <a:lnRef idx="2">
+            <a:schemeClr val="accent1">
+              <a:shade val="50000"/>
+            </a:schemeClr>
+          </a:lnRef>
+          <a:fillRef idx="1">
+            <a:schemeClr val="accent1"/>
+          </a:fillRef>
+          <a:effectRef idx="0">
+            <a:schemeClr val="accent1"/>
+          </a:effectRef>
+          <a:fontRef idx="minor">
+            <a:schemeClr val="lt1"/>
+          </a:fontRef>
+        </p:style>
+        <p:txBody>
+          <a:bodyPr rtlCol="0" anchor="ctr"/>
+          <a:lstStyle/>
+          <a:p>
+            <a:pPr algn="ctr"/>
+            <a:endParaRPr lang="ko-KR" altLang="en-US"/>
+          </a:p>
+        </p:txBody>
+      </p:sp>
+      <p:sp>
+        <p:nvSpPr>
+          <p:cNvPr id="15" name="직사각형 14">
+            <a:extLst>
+              <a:ext uri="{FF2B5EF4-FFF2-40B4-BE49-F238E27FC236}">
+                <a16:creationId xmlns:a16="http://schemas.microsoft.com/office/drawing/2014/main" id="{452B18B3-FCE3-44BB-86C9-5184E105F24E}"/>
+              </a:ext>
+            </a:extLst>
+          </p:cNvPr>
+          <p:cNvSpPr/>
+          <p:nvPr/>
+        </p:nvSpPr>
+        <p:spPr>
+          <a:xfrm>
+            <a:off x="6711518" y="6294268"/>
+            <a:ext cx="427443" cy="221942"/>
+          </a:xfrm>
+          <a:prstGeom prst="rect">
+            <a:avLst/>
+          </a:prstGeom>
+        </p:spPr>
+        <p:style>
+          <a:lnRef idx="2">
+            <a:schemeClr val="accent6">
+              <a:shade val="50000"/>
+            </a:schemeClr>
+          </a:lnRef>
+          <a:fillRef idx="1">
+            <a:schemeClr val="accent6"/>
+          </a:fillRef>
+          <a:effectRef idx="0">
+            <a:schemeClr val="accent6"/>
+          </a:effectRef>
+          <a:fontRef idx="minor">
+            <a:schemeClr val="lt1"/>
+          </a:fontRef>
+        </p:style>
+        <p:txBody>
+          <a:bodyPr rtlCol="0" anchor="ctr"/>
+          <a:lstStyle/>
+          <a:p>
+            <a:pPr algn="ctr"/>
+            <a:endParaRPr lang="ko-KR" altLang="en-US"/>
+          </a:p>
+        </p:txBody>
+      </p:sp>
+      <p:sp>
+        <p:nvSpPr>
+          <p:cNvPr id="21" name="직사각형 20">
+            <a:extLst>
+              <a:ext uri="{FF2B5EF4-FFF2-40B4-BE49-F238E27FC236}">
+                <a16:creationId xmlns:a16="http://schemas.microsoft.com/office/drawing/2014/main" id="{264FA761-9734-4860-A148-002BB78165A4}"/>
+              </a:ext>
+            </a:extLst>
+          </p:cNvPr>
+          <p:cNvSpPr/>
+          <p:nvPr/>
+        </p:nvSpPr>
+        <p:spPr>
+          <a:xfrm>
+            <a:off x="7138961" y="6294268"/>
+            <a:ext cx="427443" cy="221942"/>
+          </a:xfrm>
+          <a:prstGeom prst="rect">
+            <a:avLst/>
+          </a:prstGeom>
+        </p:spPr>
+        <p:style>
+          <a:lnRef idx="2">
+            <a:schemeClr val="accent2">
+              <a:shade val="50000"/>
+            </a:schemeClr>
+          </a:lnRef>
+          <a:fillRef idx="1">
+            <a:schemeClr val="accent2"/>
+          </a:fillRef>
+          <a:effectRef idx="0">
+            <a:schemeClr val="accent2"/>
+          </a:effectRef>
+          <a:fontRef idx="minor">
+            <a:schemeClr val="lt1"/>
+          </a:fontRef>
+        </p:style>
+        <p:txBody>
+          <a:bodyPr rtlCol="0" anchor="ctr"/>
+          <a:lstStyle/>
+          <a:p>
+            <a:pPr algn="ctr"/>
+            <a:endParaRPr lang="ko-KR" altLang="en-US"/>
+          </a:p>
+        </p:txBody>
+      </p:sp>
+      <p:sp>
+        <p:nvSpPr>
+          <p:cNvPr id="22" name="직사각형 21">
+            <a:extLst>
+              <a:ext uri="{FF2B5EF4-FFF2-40B4-BE49-F238E27FC236}">
+                <a16:creationId xmlns:a16="http://schemas.microsoft.com/office/drawing/2014/main" id="{1B03CF4B-297B-4F80-90E2-DE82D82D8B79}"/>
+              </a:ext>
+            </a:extLst>
+          </p:cNvPr>
+          <p:cNvSpPr/>
+          <p:nvPr/>
+        </p:nvSpPr>
+        <p:spPr>
+          <a:xfrm>
+            <a:off x="7566404" y="6294268"/>
+            <a:ext cx="427443" cy="221942"/>
+          </a:xfrm>
+          <a:prstGeom prst="rect">
+            <a:avLst/>
+          </a:prstGeom>
+        </p:spPr>
+        <p:style>
+          <a:lnRef idx="2">
+            <a:schemeClr val="accent6">
+              <a:shade val="50000"/>
+            </a:schemeClr>
+          </a:lnRef>
+          <a:fillRef idx="1">
+            <a:schemeClr val="accent6"/>
+          </a:fillRef>
+          <a:effectRef idx="0">
+            <a:schemeClr val="accent6"/>
+          </a:effectRef>
+          <a:fontRef idx="minor">
+            <a:schemeClr val="lt1"/>
+          </a:fontRef>
+        </p:style>
+        <p:txBody>
+          <a:bodyPr rtlCol="0" anchor="ctr"/>
+          <a:lstStyle/>
+          <a:p>
+            <a:pPr algn="ctr"/>
+            <a:endParaRPr lang="ko-KR" altLang="en-US"/>
+          </a:p>
+        </p:txBody>
+      </p:sp>
+      <p:sp>
+        <p:nvSpPr>
+          <p:cNvPr id="24" name="직사각형 23">
+            <a:extLst>
+              <a:ext uri="{FF2B5EF4-FFF2-40B4-BE49-F238E27FC236}">
+                <a16:creationId xmlns:a16="http://schemas.microsoft.com/office/drawing/2014/main" id="{6581B380-8800-4FF3-89C9-BF98215661B9}"/>
+              </a:ext>
+            </a:extLst>
+          </p:cNvPr>
+          <p:cNvSpPr/>
+          <p:nvPr/>
+        </p:nvSpPr>
+        <p:spPr>
+          <a:xfrm>
+            <a:off x="7993847" y="6294268"/>
+            <a:ext cx="427443" cy="221942"/>
+          </a:xfrm>
+          <a:prstGeom prst="rect">
+            <a:avLst/>
+          </a:prstGeom>
+        </p:spPr>
+        <p:style>
+          <a:lnRef idx="2">
+            <a:schemeClr val="accent2">
+              <a:shade val="50000"/>
+            </a:schemeClr>
+          </a:lnRef>
+          <a:fillRef idx="1">
+            <a:schemeClr val="accent2"/>
+          </a:fillRef>
+          <a:effectRef idx="0">
+            <a:schemeClr val="accent2"/>
+          </a:effectRef>
+          <a:fontRef idx="minor">
+            <a:schemeClr val="lt1"/>
+          </a:fontRef>
+        </p:style>
+        <p:txBody>
+          <a:bodyPr rtlCol="0" anchor="ctr"/>
+          <a:lstStyle/>
+          <a:p>
+            <a:pPr algn="ctr"/>
+            <a:endParaRPr lang="ko-KR" altLang="en-US"/>
+          </a:p>
+        </p:txBody>
+      </p:sp>
+      <p:sp>
+        <p:nvSpPr>
+          <p:cNvPr id="25" name="직사각형 24">
+            <a:extLst>
+              <a:ext uri="{FF2B5EF4-FFF2-40B4-BE49-F238E27FC236}">
+                <a16:creationId xmlns:a16="http://schemas.microsoft.com/office/drawing/2014/main" id="{85BAB174-50B7-47E0-BFCB-AF20AC1B58C1}"/>
+              </a:ext>
+            </a:extLst>
+          </p:cNvPr>
+          <p:cNvSpPr/>
+          <p:nvPr/>
+        </p:nvSpPr>
+        <p:spPr>
+          <a:xfrm>
+            <a:off x="8421290" y="6294268"/>
+            <a:ext cx="427443" cy="221942"/>
+          </a:xfrm>
+          <a:prstGeom prst="rect">
+            <a:avLst/>
+          </a:prstGeom>
+        </p:spPr>
+        <p:style>
+          <a:lnRef idx="2">
+            <a:schemeClr val="accent6">
+              <a:shade val="50000"/>
+            </a:schemeClr>
+          </a:lnRef>
+          <a:fillRef idx="1">
+            <a:schemeClr val="accent6"/>
+          </a:fillRef>
+          <a:effectRef idx="0">
+            <a:schemeClr val="accent6"/>
+          </a:effectRef>
+          <a:fontRef idx="minor">
+            <a:schemeClr val="lt1"/>
+          </a:fontRef>
+        </p:style>
+        <p:txBody>
+          <a:bodyPr rtlCol="0" anchor="ctr"/>
+          <a:lstStyle/>
+          <a:p>
+            <a:pPr algn="ctr"/>
+            <a:endParaRPr lang="ko-KR" altLang="en-US"/>
+          </a:p>
+        </p:txBody>
+      </p:sp>
+      <p:sp>
+        <p:nvSpPr>
+          <p:cNvPr id="26" name="직사각형 25">
+            <a:extLst>
+              <a:ext uri="{FF2B5EF4-FFF2-40B4-BE49-F238E27FC236}">
+                <a16:creationId xmlns:a16="http://schemas.microsoft.com/office/drawing/2014/main" id="{70C7E408-C717-44EB-9621-AD69D7DD3E29}"/>
+              </a:ext>
+            </a:extLst>
+          </p:cNvPr>
+          <p:cNvSpPr/>
+          <p:nvPr/>
+        </p:nvSpPr>
+        <p:spPr>
+          <a:xfrm>
+            <a:off x="8848733" y="6294268"/>
+            <a:ext cx="427443" cy="221942"/>
+          </a:xfrm>
+          <a:prstGeom prst="rect">
+            <a:avLst/>
+          </a:prstGeom>
+        </p:spPr>
+        <p:style>
+          <a:lnRef idx="2">
+            <a:schemeClr val="accent2">
+              <a:shade val="50000"/>
+            </a:schemeClr>
+          </a:lnRef>
+          <a:fillRef idx="1">
+            <a:schemeClr val="accent2"/>
+          </a:fillRef>
+          <a:effectRef idx="0">
+            <a:schemeClr val="accent2"/>
+          </a:effectRef>
+          <a:fontRef idx="minor">
+            <a:schemeClr val="lt1"/>
+          </a:fontRef>
+        </p:style>
+        <p:txBody>
+          <a:bodyPr rtlCol="0" anchor="ctr"/>
+          <a:lstStyle/>
+          <a:p>
+            <a:pPr algn="ctr"/>
+            <a:endParaRPr lang="ko-KR" altLang="en-US"/>
+          </a:p>
+        </p:txBody>
+      </p:sp>
+      <p:sp>
+        <p:nvSpPr>
+          <p:cNvPr id="27" name="직사각형 26">
+            <a:extLst>
+              <a:ext uri="{FF2B5EF4-FFF2-40B4-BE49-F238E27FC236}">
+                <a16:creationId xmlns:a16="http://schemas.microsoft.com/office/drawing/2014/main" id="{B95CBCD9-3E1A-4F31-B8AD-3F1140AF0191}"/>
+              </a:ext>
+            </a:extLst>
+          </p:cNvPr>
+          <p:cNvSpPr/>
+          <p:nvPr/>
+        </p:nvSpPr>
+        <p:spPr>
+          <a:xfrm>
+            <a:off x="9276176" y="6294268"/>
+            <a:ext cx="427443" cy="221942"/>
+          </a:xfrm>
+          <a:prstGeom prst="rect">
+            <a:avLst/>
+          </a:prstGeom>
+        </p:spPr>
+        <p:style>
+          <a:lnRef idx="2">
+            <a:schemeClr val="accent6">
+              <a:shade val="50000"/>
+            </a:schemeClr>
+          </a:lnRef>
+          <a:fillRef idx="1">
+            <a:schemeClr val="accent6"/>
+          </a:fillRef>
+          <a:effectRef idx="0">
+            <a:schemeClr val="accent6"/>
+          </a:effectRef>
+          <a:fontRef idx="minor">
+            <a:schemeClr val="lt1"/>
+          </a:fontRef>
+        </p:style>
+        <p:txBody>
+          <a:bodyPr rtlCol="0" anchor="ctr"/>
+          <a:lstStyle/>
+          <a:p>
+            <a:pPr algn="ctr"/>
+            <a:endParaRPr lang="ko-KR" altLang="en-US"/>
+          </a:p>
+        </p:txBody>
+      </p:sp>
+      <p:sp>
+        <p:nvSpPr>
+          <p:cNvPr id="28" name="직사각형 27">
+            <a:extLst>
+              <a:ext uri="{FF2B5EF4-FFF2-40B4-BE49-F238E27FC236}">
+                <a16:creationId xmlns:a16="http://schemas.microsoft.com/office/drawing/2014/main" id="{0BDFC374-3D09-4349-84FA-E0978DDA0676}"/>
+              </a:ext>
+            </a:extLst>
+          </p:cNvPr>
+          <p:cNvSpPr/>
+          <p:nvPr/>
+        </p:nvSpPr>
+        <p:spPr>
+          <a:xfrm>
+            <a:off x="9703619" y="6294268"/>
+            <a:ext cx="427443" cy="221942"/>
+          </a:xfrm>
+          <a:prstGeom prst="rect">
+            <a:avLst/>
+          </a:prstGeom>
+        </p:spPr>
+        <p:style>
+          <a:lnRef idx="2">
+            <a:schemeClr val="accent4">
+              <a:shade val="50000"/>
+            </a:schemeClr>
+          </a:lnRef>
+          <a:fillRef idx="1">
+            <a:schemeClr val="accent4"/>
+          </a:fillRef>
+          <a:effectRef idx="0">
+            <a:schemeClr val="accent4"/>
+          </a:effectRef>
+          <a:fontRef idx="minor">
+            <a:schemeClr val="lt1"/>
+          </a:fontRef>
+        </p:style>
+        <p:txBody>
+          <a:bodyPr rtlCol="0" anchor="ctr"/>
+          <a:lstStyle/>
+          <a:p>
+            <a:pPr algn="ctr"/>
+            <a:endParaRPr lang="ko-KR" altLang="en-US"/>
+          </a:p>
+        </p:txBody>
+      </p:sp>
+      <p:sp>
+        <p:nvSpPr>
+          <p:cNvPr id="29" name="직사각형 28">
+            <a:extLst>
+              <a:ext uri="{FF2B5EF4-FFF2-40B4-BE49-F238E27FC236}">
+                <a16:creationId xmlns:a16="http://schemas.microsoft.com/office/drawing/2014/main" id="{885FACDA-81D9-4F20-ACA8-1AC4C4F88D2C}"/>
+              </a:ext>
+            </a:extLst>
+          </p:cNvPr>
+          <p:cNvSpPr/>
+          <p:nvPr/>
+        </p:nvSpPr>
+        <p:spPr>
+          <a:xfrm>
+            <a:off x="10131062" y="6294268"/>
+            <a:ext cx="427443" cy="221942"/>
+          </a:xfrm>
+          <a:prstGeom prst="rect">
+            <a:avLst/>
+          </a:prstGeom>
+        </p:spPr>
+        <p:style>
+          <a:lnRef idx="2">
+            <a:schemeClr val="accent6">
+              <a:shade val="50000"/>
+            </a:schemeClr>
+          </a:lnRef>
+          <a:fillRef idx="1">
+            <a:schemeClr val="accent6"/>
+          </a:fillRef>
+          <a:effectRef idx="0">
+            <a:schemeClr val="accent6"/>
+          </a:effectRef>
+          <a:fontRef idx="minor">
+            <a:schemeClr val="lt1"/>
+          </a:fontRef>
+        </p:style>
+        <p:txBody>
+          <a:bodyPr rtlCol="0" anchor="ctr"/>
+          <a:lstStyle/>
+          <a:p>
+            <a:pPr algn="ctr"/>
+            <a:endParaRPr lang="ko-KR" altLang="en-US"/>
+          </a:p>
+        </p:txBody>
+      </p:sp>
+      <p:sp>
+        <p:nvSpPr>
+          <p:cNvPr id="30" name="직사각형 29">
+            <a:extLst>
+              <a:ext uri="{FF2B5EF4-FFF2-40B4-BE49-F238E27FC236}">
+                <a16:creationId xmlns:a16="http://schemas.microsoft.com/office/drawing/2014/main" id="{1141BD9B-4590-4B4E-9F7B-7E98E83CC210}"/>
+              </a:ext>
+            </a:extLst>
+          </p:cNvPr>
+          <p:cNvSpPr/>
+          <p:nvPr/>
+        </p:nvSpPr>
+        <p:spPr>
+          <a:xfrm>
+            <a:off x="10558505" y="6294268"/>
+            <a:ext cx="427443" cy="221942"/>
+          </a:xfrm>
+          <a:prstGeom prst="rect">
+            <a:avLst/>
+          </a:prstGeom>
+        </p:spPr>
+        <p:style>
+          <a:lnRef idx="2">
+            <a:schemeClr val="accent3">
+              <a:shade val="50000"/>
+            </a:schemeClr>
+          </a:lnRef>
+          <a:fillRef idx="1">
+            <a:schemeClr val="accent3"/>
+          </a:fillRef>
+          <a:effectRef idx="0">
+            <a:schemeClr val="accent3"/>
+          </a:effectRef>
+          <a:fontRef idx="minor">
+            <a:schemeClr val="lt1"/>
+          </a:fontRef>
+        </p:style>
+        <p:txBody>
+          <a:bodyPr rtlCol="0" anchor="ctr"/>
+          <a:lstStyle/>
+          <a:p>
+            <a:pPr algn="ctr"/>
+            <a:endParaRPr lang="ko-KR" altLang="en-US"/>
+          </a:p>
+        </p:txBody>
+      </p:sp>
+      <p:sp>
+        <p:nvSpPr>
+          <p:cNvPr id="31" name="직사각형 30">
+            <a:extLst>
+              <a:ext uri="{FF2B5EF4-FFF2-40B4-BE49-F238E27FC236}">
+                <a16:creationId xmlns:a16="http://schemas.microsoft.com/office/drawing/2014/main" id="{499A17B4-F902-41A6-99FF-CB4538529E57}"/>
+              </a:ext>
+            </a:extLst>
+          </p:cNvPr>
+          <p:cNvSpPr/>
+          <p:nvPr/>
+        </p:nvSpPr>
+        <p:spPr>
+          <a:xfrm>
+            <a:off x="10985948" y="6294268"/>
+            <a:ext cx="427443" cy="221942"/>
+          </a:xfrm>
+          <a:prstGeom prst="rect">
+            <a:avLst/>
+          </a:prstGeom>
+        </p:spPr>
+        <p:style>
+          <a:lnRef idx="2">
+            <a:schemeClr val="accent3">
+              <a:shade val="50000"/>
+            </a:schemeClr>
+          </a:lnRef>
+          <a:fillRef idx="1">
+            <a:schemeClr val="accent3"/>
+          </a:fillRef>
+          <a:effectRef idx="0">
+            <a:schemeClr val="accent3"/>
+          </a:effectRef>
+          <a:fontRef idx="minor">
+            <a:schemeClr val="lt1"/>
+          </a:fontRef>
+        </p:style>
+        <p:txBody>
+          <a:bodyPr rtlCol="0" anchor="ctr"/>
+          <a:lstStyle/>
+          <a:p>
+            <a:pPr algn="ctr"/>
+            <a:endParaRPr lang="ko-KR" altLang="en-US"/>
+          </a:p>
+        </p:txBody>
+      </p:sp>
+      <p:sp>
+        <p:nvSpPr>
+          <p:cNvPr id="32" name="직사각형 31">
+            <a:extLst>
+              <a:ext uri="{FF2B5EF4-FFF2-40B4-BE49-F238E27FC236}">
+                <a16:creationId xmlns:a16="http://schemas.microsoft.com/office/drawing/2014/main" id="{C221A718-1F3E-4344-ADEF-05ED6A6A07BA}"/>
+              </a:ext>
+            </a:extLst>
+          </p:cNvPr>
+          <p:cNvSpPr/>
+          <p:nvPr/>
+        </p:nvSpPr>
+        <p:spPr>
+          <a:xfrm>
+            <a:off x="11413391" y="6294268"/>
+            <a:ext cx="427443" cy="221942"/>
+          </a:xfrm>
+          <a:prstGeom prst="rect">
+            <a:avLst/>
+          </a:prstGeom>
+        </p:spPr>
+        <p:style>
+          <a:lnRef idx="2">
+            <a:schemeClr val="accent3">
+              <a:shade val="50000"/>
+            </a:schemeClr>
+          </a:lnRef>
+          <a:fillRef idx="1">
+            <a:schemeClr val="accent3"/>
+          </a:fillRef>
+          <a:effectRef idx="0">
+            <a:schemeClr val="accent3"/>
+          </a:effectRef>
+          <a:fontRef idx="minor">
+            <a:schemeClr val="lt1"/>
+          </a:fontRef>
+        </p:style>
+        <p:txBody>
+          <a:bodyPr rtlCol="0" anchor="ctr"/>
+          <a:lstStyle/>
+          <a:p>
+            <a:pPr algn="ctr"/>
+            <a:endParaRPr lang="ko-KR" altLang="en-US"/>
           </a:p>
         </p:txBody>
       </p:sp>
@@ -4296,6 +4928,168 @@
       </p:grpSpPr>
       <p:sp>
         <p:nvSpPr>
+          <p:cNvPr id="4" name="TextBox 3">
+            <a:extLst>
+              <a:ext uri="{FF2B5EF4-FFF2-40B4-BE49-F238E27FC236}">
+                <a16:creationId xmlns:a16="http://schemas.microsoft.com/office/drawing/2014/main" id="{89AFF4C5-FB65-4670-AD04-1BA18CADC564}"/>
+              </a:ext>
+            </a:extLst>
+          </p:cNvPr>
+          <p:cNvSpPr txBox="1"/>
+          <p:nvPr/>
+        </p:nvSpPr>
+        <p:spPr>
+          <a:xfrm>
+            <a:off x="190266" y="208005"/>
+            <a:ext cx="11856732" cy="1938992"/>
+          </a:xfrm>
+          <a:prstGeom prst="rect">
+            <a:avLst/>
+          </a:prstGeom>
+          <a:noFill/>
+        </p:spPr>
+        <p:txBody>
+          <a:bodyPr wrap="square" rtlCol="0">
+            <a:spAutoFit/>
+          </a:bodyPr>
+          <a:lstStyle/>
+          <a:p>
+            <a:r>
+              <a:rPr lang="en-US" altLang="ko-KR" sz="1200" dirty="0"/>
+              <a:t>Future updates:</a:t>
+            </a:r>
+          </a:p>
+          <a:p>
+            <a:pPr marL="171450" indent="-171450">
+              <a:buFontTx/>
+              <a:buChar char="-"/>
+            </a:pPr>
+            <a:r>
+              <a:rPr lang="en-US" altLang="ko-KR" sz="1200" dirty="0"/>
+              <a:t>Add transitions to the pop-up; </a:t>
+            </a:r>
+            <a:r>
+              <a:rPr lang="ko-KR" altLang="en-US" sz="1200" dirty="0" err="1"/>
+              <a:t>ㅇ</a:t>
+            </a:r>
+            <a:endParaRPr lang="en-US" altLang="ko-KR" sz="1200" dirty="0"/>
+          </a:p>
+          <a:p>
+            <a:pPr marL="171450" indent="-171450">
+              <a:buFontTx/>
+              <a:buChar char="-"/>
+            </a:pPr>
+            <a:r>
+              <a:rPr lang="en-US" altLang="ko-KR" sz="1200" dirty="0"/>
+              <a:t>Get user input for session, rest, long rest times.(take only positive integer input)  o</a:t>
+            </a:r>
+          </a:p>
+          <a:p>
+            <a:pPr marL="171450" indent="-171450">
+              <a:buFontTx/>
+              <a:buChar char="-"/>
+            </a:pPr>
+            <a:r>
+              <a:rPr lang="en-US" altLang="ko-KR" sz="1200" dirty="0"/>
+              <a:t>Enable keyboard shortcuts. Spacebar for play, pause, R for reset, O for options o</a:t>
+            </a:r>
+          </a:p>
+          <a:p>
+            <a:pPr marL="171450" indent="-171450">
+              <a:buFontTx/>
+              <a:buChar char="-"/>
+            </a:pPr>
+            <a:r>
+              <a:rPr lang="en-US" altLang="ko-KR" sz="1200" dirty="0"/>
+              <a:t>Include repeat forever checkbox for session number o</a:t>
+            </a:r>
+          </a:p>
+          <a:p>
+            <a:pPr marL="171450" indent="-171450">
+              <a:buFontTx/>
+              <a:buChar char="-"/>
+            </a:pPr>
+            <a:r>
+              <a:rPr lang="en-US" altLang="ko-KR" sz="1200" dirty="0"/>
+              <a:t>When clicked on the menu, be able to go back to any part of the timer</a:t>
+            </a:r>
+          </a:p>
+          <a:p>
+            <a:pPr marL="171450" indent="-171450">
+              <a:buFontTx/>
+              <a:buChar char="-"/>
+            </a:pPr>
+            <a:r>
+              <a:rPr lang="en-US" altLang="ko-KR" sz="1200" dirty="0"/>
+              <a:t>Add sound bell</a:t>
+            </a:r>
+          </a:p>
+          <a:p>
+            <a:pPr marL="171450" indent="-171450">
+              <a:buFontTx/>
+              <a:buChar char="-"/>
+            </a:pPr>
+            <a:r>
+              <a:rPr lang="en-US" altLang="ko-KR" sz="1200" dirty="0"/>
+              <a:t>Customize sound bell and when it will ring before time is out.</a:t>
+            </a:r>
+          </a:p>
+          <a:p>
+            <a:pPr marL="171450" indent="-171450">
+              <a:buFontTx/>
+              <a:buChar char="-"/>
+            </a:pPr>
+            <a:r>
+              <a:rPr lang="en-US" altLang="ko-KR" sz="1200"/>
+              <a:t>Make a circular progress bar around the clock. </a:t>
+            </a:r>
+            <a:endParaRPr lang="en-US" altLang="ko-KR" sz="1200" dirty="0"/>
+          </a:p>
+          <a:p>
+            <a:pPr marL="171450" indent="-171450">
+              <a:buFontTx/>
+              <a:buChar char="-"/>
+            </a:pPr>
+            <a:r>
+              <a:rPr lang="en-US" altLang="ko-KR" sz="1200" dirty="0"/>
+              <a:t>Make a linear progression bar at the bottom showing which section the user is currently at.  Toggle hide and show. </a:t>
+            </a:r>
+            <a:endParaRPr lang="ko-KR" altLang="en-US" sz="1200" dirty="0"/>
+          </a:p>
+        </p:txBody>
+      </p:sp>
+    </p:spTree>
+    <p:extLst>
+      <p:ext uri="{BB962C8B-B14F-4D97-AF65-F5344CB8AC3E}">
+        <p14:creationId xmlns:p14="http://schemas.microsoft.com/office/powerpoint/2010/main" val="4167062796"/>
+      </p:ext>
+    </p:extLst>
+  </p:cSld>
+  <p:clrMapOvr>
+    <a:masterClrMapping/>
+  </p:clrMapOvr>
+</p:sld>
+</file>
+
+<file path=ppt/slides/slide3.xml><?xml version="1.0" encoding="utf-8"?>
+<p:sld xmlns:a="http://schemas.openxmlformats.org/drawingml/2006/main" xmlns:r="http://schemas.openxmlformats.org/officeDocument/2006/relationships" xmlns:p="http://schemas.openxmlformats.org/presentationml/2006/main">
+  <p:cSld>
+    <p:spTree>
+      <p:nvGrpSpPr>
+        <p:cNvPr id="1" name=""/>
+        <p:cNvGrpSpPr/>
+        <p:nvPr/>
+      </p:nvGrpSpPr>
+      <p:grpSpPr>
+        <a:xfrm>
+          <a:off x="0" y="0"/>
+          <a:ext cx="0" cy="0"/>
+          <a:chOff x="0" y="0"/>
+          <a:chExt cx="0" cy="0"/>
+        </a:xfrm>
+      </p:grpSpPr>
+      <p:sp>
+        <p:nvSpPr>
           <p:cNvPr id="2" name="제목 1">
             <a:extLst>
               <a:ext uri="{FF2B5EF4-FFF2-40B4-BE49-F238E27FC236}">
@@ -4551,7 +5345,7 @@
         </p:blipFill>
         <p:spPr>
           <a:xfrm>
-            <a:off x="-549145" y="-1835250"/>
+            <a:off x="5377203" y="592302"/>
             <a:ext cx="6734175" cy="5114925"/>
           </a:xfrm>
           <a:prstGeom prst="rect">

</xml_diff>

<commit_message>
optimized for mobile display
</commit_message>
<xml_diff>
--- a/design/design.pptx
+++ b/design/design.pptx
@@ -4941,7 +4941,7 @@
         <p:spPr>
           <a:xfrm>
             <a:off x="190266" y="208005"/>
-            <a:ext cx="11856732" cy="2492990"/>
+            <a:ext cx="11856732" cy="3416320"/>
           </a:xfrm>
           <a:prstGeom prst="rect">
             <a:avLst/>
@@ -5081,11 +5081,55 @@
             </a:pPr>
             <a:r>
               <a:rPr lang="en-US" altLang="ko-KR" sz="1200" dirty="0"/>
-              <a:t>Accessibility for mobile devices. Somehow it </a:t>
+              <a:t>Accessibility for mobile devices. Somehow it doesn’t work. </a:t>
+            </a:r>
+          </a:p>
+          <a:p>
+            <a:pPr marL="171450" indent="-171450">
+              <a:buFontTx/>
+              <a:buChar char="-"/>
+            </a:pPr>
+            <a:r>
+              <a:rPr lang="en-US" altLang="ko-KR" sz="1200" dirty="0"/>
+              <a:t>Use ‘Pomodoro Timer’ for the title tag, and then change it dynamically when the timer is started</a:t>
+            </a:r>
+          </a:p>
+          <a:p>
+            <a:pPr marL="171450" indent="-171450">
+              <a:buFontTx/>
+              <a:buChar char="-"/>
+            </a:pPr>
+            <a:r>
+              <a:rPr lang="en-US" altLang="ko-KR" sz="1200" dirty="0"/>
+              <a:t>Use meta description tag</a:t>
+            </a:r>
+          </a:p>
+          <a:p>
+            <a:pPr marL="171450" indent="-171450">
+              <a:buFontTx/>
+              <a:buChar char="-"/>
+            </a:pPr>
+            <a:r>
+              <a:rPr lang="en-US" altLang="ko-KR" sz="1200" dirty="0"/>
+              <a:t>When search term is not included in the description tag, it will not show up. (include important keywords) ex) best Pomodoro timer on the web that is guaranteed to boost your productivity</a:t>
+            </a:r>
+          </a:p>
+          <a:p>
+            <a:pPr marL="171450" indent="-171450">
+              <a:buFontTx/>
+              <a:buChar char="-"/>
+            </a:pPr>
+            <a:r>
+              <a:rPr lang="en-US" altLang="ko-KR" sz="1200" dirty="0"/>
+              <a:t>Meta keyword tag – google, </a:t>
+            </a:r>
+            <a:r>
+              <a:rPr lang="en-US" altLang="ko-KR" sz="1200" dirty="0" err="1"/>
+              <a:t>bing</a:t>
             </a:r>
             <a:r>
               <a:rPr lang="en-US" altLang="ko-KR" sz="1200"/>
-              <a:t>doesn’t work. </a:t>
+              <a:t> doesn’t use it</a:t>
             </a:r>
             <a:endParaRPr lang="ko-KR" altLang="en-US" sz="1200" dirty="0"/>
           </a:p>

</xml_diff>